<commit_message>
Biocartis material-analytical & clinical validation docs
</commit_message>
<xml_diff>
--- a/General/Resume writing/Biocartis/Interview_exercise/Interview_exercise_ppt.pptx
+++ b/General/Resume writing/Biocartis/Interview_exercise/Interview_exercise_ppt.pptx
@@ -12,6 +12,11 @@
     <p:sldId id="260" r:id="rId6"/>
     <p:sldId id="261" r:id="rId7"/>
     <p:sldId id="262" r:id="rId8"/>
+    <p:sldId id="263" r:id="rId9"/>
+    <p:sldId id="264" r:id="rId10"/>
+    <p:sldId id="265" r:id="rId11"/>
+    <p:sldId id="266" r:id="rId12"/>
+    <p:sldId id="267" r:id="rId13"/>
   </p:sldIdLst>
   <p:sldSz cx="9144000" cy="5143500" type="screen16x9"/>
   <p:notesSz cx="6858000" cy="9144000"/>
@@ -3163,6 +3168,187 @@
 </p:sld>
 </file>
 
+<file path=ppt/slides/slide10.xml><?xml version="1.0" encoding="utf-8"?>
+<p:sld xmlns:a="http://schemas.openxmlformats.org/drawingml/2006/main" xmlns:r="http://schemas.openxmlformats.org/officeDocument/2006/relationships" xmlns:p="http://schemas.openxmlformats.org/presentationml/2006/main">
+  <p:cSld>
+    <p:spTree>
+      <p:nvGrpSpPr>
+        <p:cNvPr id="1" name=""/>
+        <p:cNvGrpSpPr/>
+        <p:nvPr/>
+      </p:nvGrpSpPr>
+      <p:grpSpPr>
+        <a:xfrm>
+          <a:off x="0" y="0"/>
+          <a:ext cx="0" cy="0"/>
+          <a:chOff x="0" y="0"/>
+          <a:chExt cx="0" cy="0"/>
+        </a:xfrm>
+      </p:grpSpPr>
+      <p:sp>
+        <p:nvSpPr>
+          <p:cNvPr id="2" name="Title 1"/>
+          <p:cNvSpPr>
+            <a:spLocks noGrp="1"/>
+          </p:cNvSpPr>
+          <p:nvPr>
+            <p:ph type="title"/>
+          </p:nvPr>
+        </p:nvSpPr>
+        <p:spPr/>
+        <p:txBody>
+          <a:bodyPr/>
+          <a:lstStyle/>
+          <a:p>
+            <a:pPr lvl="0" indent="0" marL="0">
+              <a:buNone/>
+            </a:pPr>
+            <a:r>
+              <a:rPr/>
+              <a:t>Extras</a:t>
+            </a:r>
+          </a:p>
+        </p:txBody>
+      </p:sp>
+      <p:pic>
+        <p:nvPicPr>
+          <p:cNvPr descr="graphs/OperatorvsdetectionPlot.png" id="0" name="Picture 1"/>
+          <p:cNvPicPr>
+            <a:picLocks noGrp="1" noChangeAspect="1"/>
+          </p:cNvPicPr>
+          <p:nvPr/>
+        </p:nvPicPr>
+        <p:blipFill>
+          <a:blip r:embed="rId2"/>
+          <a:stretch>
+            <a:fillRect/>
+          </a:stretch>
+        </p:blipFill>
+        <p:spPr bwMode="auto">
+          <a:xfrm>
+            <a:off x="2362200" y="1193800"/>
+            <a:ext cx="4406900" cy="3390900"/>
+          </a:xfrm>
+          <a:prstGeom prst="rect">
+            <a:avLst/>
+          </a:prstGeom>
+          <a:noFill/>
+          <a:ln w="9525">
+            <a:noFill/>
+            <a:headEnd/>
+            <a:tailEnd/>
+          </a:ln>
+        </p:spPr>
+      </p:pic>
+    </p:spTree>
+  </p:cSld>
+</p:sld>
+</file>
+
+<file path=ppt/slides/slide11.xml><?xml version="1.0" encoding="utf-8"?>
+<p:sld xmlns:a="http://schemas.openxmlformats.org/drawingml/2006/main" xmlns:r="http://schemas.openxmlformats.org/officeDocument/2006/relationships" xmlns:p="http://schemas.openxmlformats.org/presentationml/2006/main">
+  <p:cSld>
+    <p:spTree>
+      <p:nvGrpSpPr>
+        <p:cNvPr id="1" name=""/>
+        <p:cNvGrpSpPr/>
+        <p:nvPr/>
+      </p:nvGrpSpPr>
+      <p:grpSpPr>
+        <a:xfrm>
+          <a:off x="0" y="0"/>
+          <a:ext cx="0" cy="0"/>
+          <a:chOff x="0" y="0"/>
+          <a:chExt cx="0" cy="0"/>
+        </a:xfrm>
+      </p:grpSpPr>
+      <p:pic>
+        <p:nvPicPr>
+          <p:cNvPr descr="graphs/DatevsdetectionPlot.png" id="0" name="Picture 1"/>
+          <p:cNvPicPr>
+            <a:picLocks noGrp="1" noChangeAspect="1"/>
+          </p:cNvPicPr>
+          <p:nvPr/>
+        </p:nvPicPr>
+        <p:blipFill>
+          <a:blip r:embed="rId2"/>
+          <a:stretch>
+            <a:fillRect/>
+          </a:stretch>
+        </p:blipFill>
+        <p:spPr bwMode="auto">
+          <a:xfrm>
+            <a:off x="2362200" y="1193800"/>
+            <a:ext cx="4406900" cy="3390900"/>
+          </a:xfrm>
+          <a:prstGeom prst="rect">
+            <a:avLst/>
+          </a:prstGeom>
+          <a:noFill/>
+          <a:ln w="9525">
+            <a:noFill/>
+            <a:headEnd/>
+            <a:tailEnd/>
+          </a:ln>
+        </p:spPr>
+      </p:pic>
+    </p:spTree>
+  </p:cSld>
+</p:sld>
+</file>
+
+<file path=ppt/slides/slide12.xml><?xml version="1.0" encoding="utf-8"?>
+<p:sld xmlns:a="http://schemas.openxmlformats.org/drawingml/2006/main" xmlns:r="http://schemas.openxmlformats.org/officeDocument/2006/relationships" xmlns:p="http://schemas.openxmlformats.org/presentationml/2006/main">
+  <p:cSld>
+    <p:spTree>
+      <p:nvGrpSpPr>
+        <p:cNvPr id="1" name=""/>
+        <p:cNvGrpSpPr/>
+        <p:nvPr/>
+      </p:nvGrpSpPr>
+      <p:grpSpPr>
+        <a:xfrm>
+          <a:off x="0" y="0"/>
+          <a:ext cx="0" cy="0"/>
+          <a:chOff x="0" y="0"/>
+          <a:chExt cx="0" cy="0"/>
+        </a:xfrm>
+      </p:grpSpPr>
+      <p:pic>
+        <p:nvPicPr>
+          <p:cNvPr descr="graphs/OperatorDatevsdetectionPlot.png" id="0" name="Picture 1"/>
+          <p:cNvPicPr>
+            <a:picLocks noGrp="1" noChangeAspect="1"/>
+          </p:cNvPicPr>
+          <p:nvPr/>
+        </p:nvPicPr>
+        <p:blipFill>
+          <a:blip r:embed="rId2"/>
+          <a:stretch>
+            <a:fillRect/>
+          </a:stretch>
+        </p:blipFill>
+        <p:spPr bwMode="auto">
+          <a:xfrm>
+            <a:off x="2311400" y="1193800"/>
+            <a:ext cx="4521200" cy="3390900"/>
+          </a:xfrm>
+          <a:prstGeom prst="rect">
+            <a:avLst/>
+          </a:prstGeom>
+          <a:noFill/>
+          <a:ln w="9525">
+            <a:noFill/>
+            <a:headEnd/>
+            <a:tailEnd/>
+          </a:ln>
+        </p:spPr>
+      </p:pic>
+    </p:spTree>
+  </p:cSld>
+</p:sld>
+</file>
+
 <file path=ppt/slides/slide2.xml><?xml version="1.0" encoding="utf-8"?>
 <p:sld xmlns:a="http://schemas.openxmlformats.org/drawingml/2006/main" xmlns:r="http://schemas.openxmlformats.org/officeDocument/2006/relationships" xmlns:p="http://schemas.openxmlformats.org/presentationml/2006/main">
   <p:cSld>
@@ -3257,7 +3443,7 @@
       </p:sp>
       <p:graphicFrame xmlns:a="http://schemas.openxmlformats.org/drawingml/2006/main" xmlns:r="http://schemas.openxmlformats.org/officeDocument/2006/relationships" xmlns:p="http://schemas.openxmlformats.org/presentationml/2006/main">
         <p:nvGraphicFramePr>
-          <p:cNvPr id="88041678" name=""/>
+          <p:cNvPr id="577360507" name=""/>
           <p:cNvGraphicFramePr>
             <a:graphicFrameLocks noGrp="true"/>
           </p:cNvGraphicFramePr>
@@ -3797,7 +3983,7 @@
                           <a:ea typeface="Arial"/>
                           <a:sym typeface="Arial"/>
                         </a:rPr>
-                        <a:t>23</a:t>
+                        <a:t>24</a:t>
                       </a:r>
                     </a:p>
                   </a:txBody>
@@ -3870,7 +4056,7 @@
                           <a:ea typeface="Arial"/>
                           <a:sym typeface="Arial"/>
                         </a:rPr>
-                        <a:t>21(0.91)</a:t>
+                        <a:t>22(0.92)</a:t>
                       </a:r>
                     </a:p>
                   </a:txBody>
@@ -4014,7 +4200,7 @@
                           <a:ea typeface="Arial"/>
                           <a:sym typeface="Arial"/>
                         </a:rPr>
-                        <a:t>23</a:t>
+                        <a:t>24</a:t>
                       </a:r>
                     </a:p>
                   </a:txBody>
@@ -4087,7 +4273,7 @@
                           <a:ea typeface="Arial"/>
                           <a:sym typeface="Arial"/>
                         </a:rPr>
-                        <a:t>23(1.00)</a:t>
+                        <a:t>24(1.00)</a:t>
                       </a:r>
                     </a:p>
                   </a:txBody>
@@ -5106,62 +5292,1245 @@
           <a:chExt cx="0" cy="0"/>
         </a:xfrm>
       </p:grpSpPr>
-      <p:sp>
-        <p:nvSpPr>
-          <p:cNvPr id="3" name="Content Placeholder 2"/>
-          <p:cNvSpPr>
-            <a:spLocks noGrp="1"/>
-          </p:cNvSpPr>
-          <p:nvPr>
-            <p:ph idx="1"/>
-          </p:nvPr>
-        </p:nvSpPr>
-        <p:spPr/>
-        <p:txBody>
-          <a:bodyPr/>
-          <a:lstStyle/>
-          <a:p>
-            <a:pPr lvl="0" indent="0" marL="0">
-              <a:spcBef>
-                <a:spcPts val="3000"/>
-              </a:spcBef>
-              <a:buNone/>
-            </a:pPr>
-            <a:r>
-              <a:rPr b="1"/>
-              <a:t>3. Statistical model</a:t>
-            </a:r>
-          </a:p>
-          <a:p>
-            <a:pPr lvl="0"/>
-            <a:r>
-              <a:rPr/>
-              <a:t>Lowest input level (cps/ml) with 95% positive call rates:</a:t>
-            </a:r>
-          </a:p>
-          <a:p>
-            <a:pPr lvl="1"/>
-            <a:r>
-              <a:rPr/>
-              <a:t>285</a:t>
-            </a:r>
-          </a:p>
-          <a:p>
-            <a:pPr lvl="0"/>
-            <a:r>
-              <a:rPr/>
-              <a:t>Corresponding 95% Wilson CI for the input level (cps/ml):</a:t>
-            </a:r>
-          </a:p>
-          <a:p>
-            <a:pPr lvl="1"/>
-            <a:r>
-              <a:rPr/>
-              <a:t>c(147, 423)</a:t>
-            </a:r>
-          </a:p>
-        </p:txBody>
-      </p:sp>
+      <mc:AlternateContent xmlns:mc="http://schemas.openxmlformats.org/markup-compatibility/2006">
+        <mc:Choice xmlns:a14="http://schemas.microsoft.com/office/drawing/2010/main" Requires="a14">
+          <p:sp>
+            <p:nvSpPr>
+              <p:cNvPr id="3" name="Content Placeholder 2"/>
+              <p:cNvSpPr>
+                <a:spLocks noGrp="1"/>
+              </p:cNvSpPr>
+              <p:nvPr>
+                <p:ph idx="1"/>
+              </p:nvPr>
+            </p:nvSpPr>
+            <p:spPr/>
+            <p:txBody>
+              <a:bodyPr/>
+              <a:lstStyle/>
+              <a:p>
+                <a:pPr lvl="0" indent="0" marL="0">
+                  <a:spcBef>
+                    <a:spcPts val="3000"/>
+                  </a:spcBef>
+                  <a:buNone/>
+                </a:pPr>
+                <a:r>
+                  <a:rPr b="1"/>
+                  <a:t>3. Statistical model</a:t>
+                </a:r>
+              </a:p>
+              <a:p>
+                <a:pPr lvl="0"/>
+                <a14:m>
+                  <m:oMath xmlns:m="http://schemas.openxmlformats.org/officeDocument/2006/math">
+                    <m:r>
+                      <m:rPr>
+                        <m:nor/>
+                        <m:sty m:val="p"/>
+                      </m:rPr>
+                      <m:t>logit(</m:t>
+                    </m:r>
+                    <m:r>
+                      <m:t>p</m:t>
+                    </m:r>
+                    <m:r>
+                      <m:rPr>
+                        <m:nor/>
+                        <m:sty m:val="p"/>
+                      </m:rPr>
+                      <m:t>)</m:t>
+                    </m:r>
+                    <m:r>
+                      <m:rPr>
+                        <m:sty m:val="p"/>
+                      </m:rPr>
+                      <m:t>=</m:t>
+                    </m:r>
+                    <m:sSub>
+                      <m:e>
+                        <m:r>
+                          <m:t>β</m:t>
+                        </m:r>
+                      </m:e>
+                      <m:sub>
+                        <m:r>
+                          <m:t>0</m:t>
+                        </m:r>
+                      </m:sub>
+                    </m:sSub>
+                    <m:r>
+                      <m:rPr>
+                        <m:sty m:val="p"/>
+                      </m:rPr>
+                      <m:t>+</m:t>
+                    </m:r>
+                    <m:sSub>
+                      <m:e>
+                        <m:r>
+                          <m:t>β</m:t>
+                        </m:r>
+                      </m:e>
+                      <m:sub>
+                        <m:r>
+                          <m:t>1</m:t>
+                        </m:r>
+                      </m:sub>
+                    </m:sSub>
+                    <m:r>
+                      <m:rPr>
+                        <m:nor/>
+                        <m:sty m:val="p"/>
+                      </m:rPr>
+                      <m:t>*input level</m:t>
+                    </m:r>
+                  </m:oMath>
+                </a14:m>
+              </a:p>
+            </p:txBody>
+          </p:sp>
+        </mc:Choice>
+      </mc:AlternateContent>
+      <p:graphicFrame xmlns:a="http://schemas.openxmlformats.org/drawingml/2006/main" xmlns:r="http://schemas.openxmlformats.org/officeDocument/2006/relationships" xmlns:p="http://schemas.openxmlformats.org/presentationml/2006/main">
+        <p:nvGraphicFramePr>
+          <p:cNvPr id="741924948" name=""/>
+          <p:cNvGraphicFramePr>
+            <a:graphicFrameLocks noGrp="true"/>
+          </p:cNvGraphicFramePr>
+          <p:nvPr/>
+        </p:nvGraphicFramePr>
+        <p:xfrm rot="0">
+          <a:off x="914400" y="1828800"/>
+          <a:ext cx="9144000" cy="5486400"/>
+        </p:xfrm>
+        <a:graphic>
+          <a:graphicData uri="http://schemas.openxmlformats.org/drawingml/2006/table">
+            <a:tbl>
+              <a:tblPr/>
+              <a:tblGrid>
+                <a:gridCol w="914400"/>
+                <a:gridCol w="685800"/>
+                <a:gridCol w="822960"/>
+                <a:gridCol w="685800"/>
+                <a:gridCol w="685800"/>
+              </a:tblGrid>
+              <a:tr h="228600">
+                <a:tc>
+                  <a:txBody>
+                    <a:bodyPr/>
+                    <a:lstStyle/>
+                    <a:p>
+                      <a:pPr algn="l" marL="63500" marR="63500">
+                        <a:lnSpc>
+                          <a:spcPct val="100000"/>
+                        </a:lnSpc>
+                        <a:spcBef>
+                          <a:spcPts val="500"/>
+                        </a:spcBef>
+                        <a:spcAft>
+                          <a:spcPts val="500"/>
+                        </a:spcAft>
+                        <a:buNone/>
+                      </a:pPr>
+                      <a:r>
+                        <a:rPr cap="none" sz="1100" i="0" b="0" u="none">
+                          <a:solidFill>
+                            <a:srgbClr val="000000">
+                              <a:alpha val="100000"/>
+                            </a:srgbClr>
+                          </a:solidFill>
+                          <a:latin typeface="Arial"/>
+                          <a:cs typeface="Arial"/>
+                          <a:ea typeface="Arial"/>
+                          <a:sym typeface="Arial"/>
+                        </a:rPr>
+                        <a:t>Parameter</a:t>
+                      </a:r>
+                    </a:p>
+                  </a:txBody>
+                  <a:tcPr anchor="ctr" marB="63500" marT="63500" marR="0" marL="0">
+                    <a:lnL algn="ctr" cmpd="sng" cap="flat" w="0">
+                      <a:noFill/>
+                      <a:prstDash val="solid"/>
+                    </a:lnL>
+                    <a:lnR algn="ctr" cmpd="sng" cap="flat" w="12700">
+                      <a:solidFill>
+                        <a:srgbClr val="BEBEBE">
+                          <a:alpha val="100000"/>
+                        </a:srgbClr>
+                      </a:solidFill>
+                      <a:prstDash val="solid"/>
+                    </a:lnR>
+                    <a:lnT algn="ctr" cmpd="sng" cap="flat" w="25400">
+                      <a:solidFill>
+                        <a:srgbClr val="000000">
+                          <a:alpha val="100000"/>
+                        </a:srgbClr>
+                      </a:solidFill>
+                      <a:prstDash val="solid"/>
+                    </a:lnT>
+                    <a:lnB algn="ctr" cmpd="sng" cap="flat" w="25400">
+                      <a:solidFill>
+                        <a:srgbClr val="000000">
+                          <a:alpha val="100000"/>
+                        </a:srgbClr>
+                      </a:solidFill>
+                      <a:prstDash val="solid"/>
+                    </a:lnB>
+                    <a:solidFill>
+                      <a:srgbClr val="FFFFFF">
+                        <a:alpha val="0"/>
+                      </a:srgbClr>
+                    </a:solidFill>
+                  </a:tcPr>
+                </a:tc>
+                <a:tc>
+                  <a:txBody>
+                    <a:bodyPr/>
+                    <a:lstStyle/>
+                    <a:p>
+                      <a:pPr algn="ctr" marL="63500" marR="63500">
+                        <a:lnSpc>
+                          <a:spcPct val="100000"/>
+                        </a:lnSpc>
+                        <a:spcBef>
+                          <a:spcPts val="500"/>
+                        </a:spcBef>
+                        <a:spcAft>
+                          <a:spcPts val="500"/>
+                        </a:spcAft>
+                        <a:buNone/>
+                      </a:pPr>
+                      <a:r>
+                        <a:rPr cap="none" sz="1100" i="0" b="0" u="none">
+                          <a:solidFill>
+                            <a:srgbClr val="000000">
+                              <a:alpha val="100000"/>
+                            </a:srgbClr>
+                          </a:solidFill>
+                          <a:latin typeface="Arial"/>
+                          <a:cs typeface="Arial"/>
+                          <a:ea typeface="Arial"/>
+                          <a:sym typeface="Arial"/>
+                        </a:rPr>
+                        <a:t>Est.</a:t>
+                      </a:r>
+                    </a:p>
+                  </a:txBody>
+                  <a:tcPr anchor="ctr" marB="63500" marT="63500" marR="0" marL="0">
+                    <a:lnL algn="ctr" cmpd="sng" cap="flat" w="12700">
+                      <a:solidFill>
+                        <a:srgbClr val="BEBEBE">
+                          <a:alpha val="100000"/>
+                        </a:srgbClr>
+                      </a:solidFill>
+                      <a:prstDash val="solid"/>
+                    </a:lnL>
+                    <a:lnR algn="ctr" cmpd="sng" cap="flat" w="12700">
+                      <a:solidFill>
+                        <a:srgbClr val="BEBEBE">
+                          <a:alpha val="100000"/>
+                        </a:srgbClr>
+                      </a:solidFill>
+                      <a:prstDash val="solid"/>
+                    </a:lnR>
+                    <a:lnT algn="ctr" cmpd="sng" cap="flat" w="25400">
+                      <a:solidFill>
+                        <a:srgbClr val="000000">
+                          <a:alpha val="100000"/>
+                        </a:srgbClr>
+                      </a:solidFill>
+                      <a:prstDash val="solid"/>
+                    </a:lnT>
+                    <a:lnB algn="ctr" cmpd="sng" cap="flat" w="25400">
+                      <a:solidFill>
+                        <a:srgbClr val="000000">
+                          <a:alpha val="100000"/>
+                        </a:srgbClr>
+                      </a:solidFill>
+                      <a:prstDash val="solid"/>
+                    </a:lnB>
+                    <a:solidFill>
+                      <a:srgbClr val="FFFFFF">
+                        <a:alpha val="0"/>
+                      </a:srgbClr>
+                    </a:solidFill>
+                  </a:tcPr>
+                </a:tc>
+                <a:tc>
+                  <a:txBody>
+                    <a:bodyPr/>
+                    <a:lstStyle/>
+                    <a:p>
+                      <a:pPr algn="ctr" marL="63500" marR="63500">
+                        <a:lnSpc>
+                          <a:spcPct val="100000"/>
+                        </a:lnSpc>
+                        <a:spcBef>
+                          <a:spcPts val="500"/>
+                        </a:spcBef>
+                        <a:spcAft>
+                          <a:spcPts val="500"/>
+                        </a:spcAft>
+                        <a:buNone/>
+                      </a:pPr>
+                      <a:r>
+                        <a:rPr cap="none" sz="1100" i="0" b="0" u="none">
+                          <a:solidFill>
+                            <a:srgbClr val="000000">
+                              <a:alpha val="100000"/>
+                            </a:srgbClr>
+                          </a:solidFill>
+                          <a:latin typeface="Arial"/>
+                          <a:cs typeface="Arial"/>
+                          <a:ea typeface="Arial"/>
+                          <a:sym typeface="Arial"/>
+                        </a:rPr>
+                        <a:t>Std. Error</a:t>
+                      </a:r>
+                    </a:p>
+                  </a:txBody>
+                  <a:tcPr anchor="ctr" marB="63500" marT="63500" marR="0" marL="0">
+                    <a:lnL algn="ctr" cmpd="sng" cap="flat" w="12700">
+                      <a:solidFill>
+                        <a:srgbClr val="BEBEBE">
+                          <a:alpha val="100000"/>
+                        </a:srgbClr>
+                      </a:solidFill>
+                      <a:prstDash val="solid"/>
+                    </a:lnL>
+                    <a:lnR algn="ctr" cmpd="sng" cap="flat" w="12700">
+                      <a:solidFill>
+                        <a:srgbClr val="BEBEBE">
+                          <a:alpha val="100000"/>
+                        </a:srgbClr>
+                      </a:solidFill>
+                      <a:prstDash val="solid"/>
+                    </a:lnR>
+                    <a:lnT algn="ctr" cmpd="sng" cap="flat" w="25400">
+                      <a:solidFill>
+                        <a:srgbClr val="000000">
+                          <a:alpha val="100000"/>
+                        </a:srgbClr>
+                      </a:solidFill>
+                      <a:prstDash val="solid"/>
+                    </a:lnT>
+                    <a:lnB algn="ctr" cmpd="sng" cap="flat" w="25400">
+                      <a:solidFill>
+                        <a:srgbClr val="000000">
+                          <a:alpha val="100000"/>
+                        </a:srgbClr>
+                      </a:solidFill>
+                      <a:prstDash val="solid"/>
+                    </a:lnB>
+                    <a:solidFill>
+                      <a:srgbClr val="FFFFFF">
+                        <a:alpha val="0"/>
+                      </a:srgbClr>
+                    </a:solidFill>
+                  </a:tcPr>
+                </a:tc>
+                <a:tc>
+                  <a:txBody>
+                    <a:bodyPr/>
+                    <a:lstStyle/>
+                    <a:p>
+                      <a:pPr algn="ctr" marL="63500" marR="63500">
+                        <a:lnSpc>
+                          <a:spcPct val="100000"/>
+                        </a:lnSpc>
+                        <a:spcBef>
+                          <a:spcPts val="500"/>
+                        </a:spcBef>
+                        <a:spcAft>
+                          <a:spcPts val="500"/>
+                        </a:spcAft>
+                        <a:buNone/>
+                      </a:pPr>
+                      <a:r>
+                        <a:rPr cap="none" sz="1100" i="0" b="0" u="none">
+                          <a:solidFill>
+                            <a:srgbClr val="000000">
+                              <a:alpha val="100000"/>
+                            </a:srgbClr>
+                          </a:solidFill>
+                          <a:latin typeface="Arial"/>
+                          <a:cs typeface="Arial"/>
+                          <a:ea typeface="Arial"/>
+                          <a:sym typeface="Arial"/>
+                        </a:rPr>
+                        <a:t>z value</a:t>
+                      </a:r>
+                    </a:p>
+                  </a:txBody>
+                  <a:tcPr anchor="ctr" marB="63500" marT="63500" marR="0" marL="0">
+                    <a:lnL algn="ctr" cmpd="sng" cap="flat" w="12700">
+                      <a:solidFill>
+                        <a:srgbClr val="BEBEBE">
+                          <a:alpha val="100000"/>
+                        </a:srgbClr>
+                      </a:solidFill>
+                      <a:prstDash val="solid"/>
+                    </a:lnL>
+                    <a:lnR algn="ctr" cmpd="sng" cap="flat" w="12700">
+                      <a:solidFill>
+                        <a:srgbClr val="BEBEBE">
+                          <a:alpha val="100000"/>
+                        </a:srgbClr>
+                      </a:solidFill>
+                      <a:prstDash val="solid"/>
+                    </a:lnR>
+                    <a:lnT algn="ctr" cmpd="sng" cap="flat" w="25400">
+                      <a:solidFill>
+                        <a:srgbClr val="000000">
+                          <a:alpha val="100000"/>
+                        </a:srgbClr>
+                      </a:solidFill>
+                      <a:prstDash val="solid"/>
+                    </a:lnT>
+                    <a:lnB algn="ctr" cmpd="sng" cap="flat" w="25400">
+                      <a:solidFill>
+                        <a:srgbClr val="000000">
+                          <a:alpha val="100000"/>
+                        </a:srgbClr>
+                      </a:solidFill>
+                      <a:prstDash val="solid"/>
+                    </a:lnB>
+                    <a:solidFill>
+                      <a:srgbClr val="FFFFFF">
+                        <a:alpha val="0"/>
+                      </a:srgbClr>
+                    </a:solidFill>
+                  </a:tcPr>
+                </a:tc>
+                <a:tc>
+                  <a:txBody>
+                    <a:bodyPr/>
+                    <a:lstStyle/>
+                    <a:p>
+                      <a:pPr algn="ctr" marL="63500" marR="63500">
+                        <a:lnSpc>
+                          <a:spcPct val="100000"/>
+                        </a:lnSpc>
+                        <a:spcBef>
+                          <a:spcPts val="500"/>
+                        </a:spcBef>
+                        <a:spcAft>
+                          <a:spcPts val="500"/>
+                        </a:spcAft>
+                        <a:buNone/>
+                      </a:pPr>
+                      <a:r>
+                        <a:rPr cap="none" sz="1100" i="0" b="0" u="none">
+                          <a:solidFill>
+                            <a:srgbClr val="000000">
+                              <a:alpha val="100000"/>
+                            </a:srgbClr>
+                          </a:solidFill>
+                          <a:latin typeface="Arial"/>
+                          <a:cs typeface="Arial"/>
+                          <a:ea typeface="Arial"/>
+                          <a:sym typeface="Arial"/>
+                        </a:rPr>
+                        <a:t>Pr(&gt;|z|)</a:t>
+                      </a:r>
+                    </a:p>
+                  </a:txBody>
+                  <a:tcPr anchor="ctr" marB="63500" marT="63500" marR="0" marL="0">
+                    <a:lnL algn="ctr" cmpd="sng" cap="flat" w="12700">
+                      <a:solidFill>
+                        <a:srgbClr val="BEBEBE">
+                          <a:alpha val="100000"/>
+                        </a:srgbClr>
+                      </a:solidFill>
+                      <a:prstDash val="solid"/>
+                    </a:lnL>
+                    <a:lnR algn="ctr" cmpd="sng" cap="flat" w="12700">
+                      <a:solidFill>
+                        <a:srgbClr val="BEBEBE">
+                          <a:alpha val="100000"/>
+                        </a:srgbClr>
+                      </a:solidFill>
+                      <a:prstDash val="solid"/>
+                    </a:lnR>
+                    <a:lnT algn="ctr" cmpd="sng" cap="flat" w="25400">
+                      <a:solidFill>
+                        <a:srgbClr val="000000">
+                          <a:alpha val="100000"/>
+                        </a:srgbClr>
+                      </a:solidFill>
+                      <a:prstDash val="solid"/>
+                    </a:lnT>
+                    <a:lnB algn="ctr" cmpd="sng" cap="flat" w="25400">
+                      <a:solidFill>
+                        <a:srgbClr val="000000">
+                          <a:alpha val="100000"/>
+                        </a:srgbClr>
+                      </a:solidFill>
+                      <a:prstDash val="solid"/>
+                    </a:lnB>
+                    <a:solidFill>
+                      <a:srgbClr val="FFFFFF">
+                        <a:alpha val="0"/>
+                      </a:srgbClr>
+                    </a:solidFill>
+                  </a:tcPr>
+                </a:tc>
+              </a:tr>
+              <a:tr h="228600">
+                <a:tc>
+                  <a:txBody>
+                    <a:bodyPr/>
+                    <a:lstStyle/>
+                    <a:p>
+                      <a:pPr algn="l" marL="63500" marR="63500">
+                        <a:lnSpc>
+                          <a:spcPct val="100000"/>
+                        </a:lnSpc>
+                        <a:spcBef>
+                          <a:spcPts val="500"/>
+                        </a:spcBef>
+                        <a:spcAft>
+                          <a:spcPts val="500"/>
+                        </a:spcAft>
+                        <a:buNone/>
+                      </a:pPr>
+                      <a:rPr cap="none" sz="1100" i="0" b="0" u="none">
+                        <a:solidFill>
+                          <a:srgbClr val="000000">
+                            <a:alpha val="100000"/>
+                          </a:srgbClr>
+                        </a:solidFill>
+                        <a:latin typeface="Arial"/>
+                        <a:cs typeface="Arial"/>
+                        <a:ea typeface="Arial"/>
+                        <a:sym typeface="Arial"/>
+                      </a:rPr>
+                      <mc:AlternateContent xmlns:mc="http://schemas.openxmlformats.org/markup-compatibility/2006">
+                        <mc:Choice xmlns:a14="http://schemas.microsoft.com/office/drawing/2010/main" Requires="a14">
+                          <a14:m xmlns:a14="http://schemas.microsoft.com/office/drawing/2010/main">
+                            <m:oMathPara xmlns:m="http://schemas.openxmlformats.org/officeDocument/2006/math">
+                              <m:oMathParaPr>
+                                <m:jc m:val="centerGroup"/>
+                              </m:oMathParaPr>
+                              <m:oMath xmlns:m="http://schemas.openxmlformats.org/officeDocument/2006/math" xmlns:mml="http://www.w3.org/1998/Math/MathML">
+                                <m:sSub>
+                                  <m:e>
+                                    <m:r>
+                                      <m:t>β</m:t>
+                                    </m:r>
+                                  </m:e>
+                                  <m:sub>
+                                    <m:r>
+                                      <m:t>0</m:t>
+                                    </m:r>
+                                  </m:sub>
+                                </m:sSub>
+                              </m:oMath>
+                            </m:oMathPara>
+                          </a14:m>
+                        </mc:Choice>
+                      </mc:AlternateContent>
+                    </a:p>
+                  </a:txBody>
+                  <a:tcPr anchor="ctr" marB="63500" marT="63500" marR="0" marL="0">
+                    <a:lnL algn="ctr" cmpd="sng" cap="flat" w="0">
+                      <a:noFill/>
+                      <a:prstDash val="solid"/>
+                    </a:lnL>
+                    <a:lnR algn="ctr" cmpd="sng" cap="flat" w="12700">
+                      <a:solidFill>
+                        <a:srgbClr val="BEBEBE">
+                          <a:alpha val="100000"/>
+                        </a:srgbClr>
+                      </a:solidFill>
+                      <a:prstDash val="solid"/>
+                    </a:lnR>
+                    <a:lnT algn="ctr" cmpd="sng" cap="flat" w="0">
+                      <a:noFill/>
+                      <a:prstDash val="solid"/>
+                    </a:lnT>
+                    <a:lnB algn="ctr" cmpd="sng" cap="flat" w="12700">
+                      <a:solidFill>
+                        <a:srgbClr val="BEBEBE">
+                          <a:alpha val="100000"/>
+                        </a:srgbClr>
+                      </a:solidFill>
+                      <a:prstDash val="solid"/>
+                    </a:lnB>
+                    <a:solidFill>
+                      <a:srgbClr val="FFFFFF">
+                        <a:alpha val="0"/>
+                      </a:srgbClr>
+                    </a:solidFill>
+                  </a:tcPr>
+                </a:tc>
+                <a:tc>
+                  <a:txBody>
+                    <a:bodyPr/>
+                    <a:lstStyle/>
+                    <a:p>
+                      <a:pPr algn="ctr" marL="63500" marR="63500">
+                        <a:lnSpc>
+                          <a:spcPct val="100000"/>
+                        </a:lnSpc>
+                        <a:spcBef>
+                          <a:spcPts val="500"/>
+                        </a:spcBef>
+                        <a:spcAft>
+                          <a:spcPts val="500"/>
+                        </a:spcAft>
+                        <a:buNone/>
+                      </a:pPr>
+                      <a:r>
+                        <a:rPr cap="none" sz="1100" i="0" b="0" u="none">
+                          <a:solidFill>
+                            <a:srgbClr val="000000">
+                              <a:alpha val="100000"/>
+                            </a:srgbClr>
+                          </a:solidFill>
+                          <a:latin typeface="Arial"/>
+                          <a:cs typeface="Arial"/>
+                          <a:ea typeface="Arial"/>
+                          <a:sym typeface="Arial"/>
+                        </a:rPr>
+                        <a:t>-0.46</a:t>
+                      </a:r>
+                    </a:p>
+                  </a:txBody>
+                  <a:tcPr anchor="ctr" marB="63500" marT="63500" marR="0" marL="0">
+                    <a:lnL algn="ctr" cmpd="sng" cap="flat" w="12700">
+                      <a:solidFill>
+                        <a:srgbClr val="BEBEBE">
+                          <a:alpha val="100000"/>
+                        </a:srgbClr>
+                      </a:solidFill>
+                      <a:prstDash val="solid"/>
+                    </a:lnL>
+                    <a:lnR algn="ctr" cmpd="sng" cap="flat" w="12700">
+                      <a:solidFill>
+                        <a:srgbClr val="BEBEBE">
+                          <a:alpha val="100000"/>
+                        </a:srgbClr>
+                      </a:solidFill>
+                      <a:prstDash val="solid"/>
+                    </a:lnR>
+                    <a:lnT algn="ctr" cmpd="sng" cap="flat" w="0">
+                      <a:noFill/>
+                      <a:prstDash val="solid"/>
+                    </a:lnT>
+                    <a:lnB algn="ctr" cmpd="sng" cap="flat" w="12700">
+                      <a:solidFill>
+                        <a:srgbClr val="BEBEBE">
+                          <a:alpha val="100000"/>
+                        </a:srgbClr>
+                      </a:solidFill>
+                      <a:prstDash val="solid"/>
+                    </a:lnB>
+                    <a:solidFill>
+                      <a:srgbClr val="FFFFFF">
+                        <a:alpha val="0"/>
+                      </a:srgbClr>
+                    </a:solidFill>
+                  </a:tcPr>
+                </a:tc>
+                <a:tc>
+                  <a:txBody>
+                    <a:bodyPr/>
+                    <a:lstStyle/>
+                    <a:p>
+                      <a:pPr algn="ctr" marL="63500" marR="63500">
+                        <a:lnSpc>
+                          <a:spcPct val="100000"/>
+                        </a:lnSpc>
+                        <a:spcBef>
+                          <a:spcPts val="500"/>
+                        </a:spcBef>
+                        <a:spcAft>
+                          <a:spcPts val="500"/>
+                        </a:spcAft>
+                        <a:buNone/>
+                      </a:pPr>
+                      <a:r>
+                        <a:rPr cap="none" sz="1100" i="0" b="0" u="none">
+                          <a:solidFill>
+                            <a:srgbClr val="000000">
+                              <a:alpha val="100000"/>
+                            </a:srgbClr>
+                          </a:solidFill>
+                          <a:latin typeface="Arial"/>
+                          <a:cs typeface="Arial"/>
+                          <a:ea typeface="Arial"/>
+                          <a:sym typeface="Arial"/>
+                        </a:rPr>
+                        <a:t>1.01</a:t>
+                      </a:r>
+                    </a:p>
+                  </a:txBody>
+                  <a:tcPr anchor="ctr" marB="63500" marT="63500" marR="0" marL="0">
+                    <a:lnL algn="ctr" cmpd="sng" cap="flat" w="12700">
+                      <a:solidFill>
+                        <a:srgbClr val="BEBEBE">
+                          <a:alpha val="100000"/>
+                        </a:srgbClr>
+                      </a:solidFill>
+                      <a:prstDash val="solid"/>
+                    </a:lnL>
+                    <a:lnR algn="ctr" cmpd="sng" cap="flat" w="12700">
+                      <a:solidFill>
+                        <a:srgbClr val="BEBEBE">
+                          <a:alpha val="100000"/>
+                        </a:srgbClr>
+                      </a:solidFill>
+                      <a:prstDash val="solid"/>
+                    </a:lnR>
+                    <a:lnT algn="ctr" cmpd="sng" cap="flat" w="0">
+                      <a:noFill/>
+                      <a:prstDash val="solid"/>
+                    </a:lnT>
+                    <a:lnB algn="ctr" cmpd="sng" cap="flat" w="12700">
+                      <a:solidFill>
+                        <a:srgbClr val="BEBEBE">
+                          <a:alpha val="100000"/>
+                        </a:srgbClr>
+                      </a:solidFill>
+                      <a:prstDash val="solid"/>
+                    </a:lnB>
+                    <a:solidFill>
+                      <a:srgbClr val="FFFFFF">
+                        <a:alpha val="0"/>
+                      </a:srgbClr>
+                    </a:solidFill>
+                  </a:tcPr>
+                </a:tc>
+                <a:tc>
+                  <a:txBody>
+                    <a:bodyPr/>
+                    <a:lstStyle/>
+                    <a:p>
+                      <a:pPr algn="ctr" marL="63500" marR="63500">
+                        <a:lnSpc>
+                          <a:spcPct val="100000"/>
+                        </a:lnSpc>
+                        <a:spcBef>
+                          <a:spcPts val="500"/>
+                        </a:spcBef>
+                        <a:spcAft>
+                          <a:spcPts val="500"/>
+                        </a:spcAft>
+                        <a:buNone/>
+                      </a:pPr>
+                      <a:r>
+                        <a:rPr cap="none" sz="1100" i="0" b="0" u="none">
+                          <a:solidFill>
+                            <a:srgbClr val="000000">
+                              <a:alpha val="100000"/>
+                            </a:srgbClr>
+                          </a:solidFill>
+                          <a:latin typeface="Arial"/>
+                          <a:cs typeface="Arial"/>
+                          <a:ea typeface="Arial"/>
+                          <a:sym typeface="Arial"/>
+                        </a:rPr>
+                        <a:t>-0.45</a:t>
+                      </a:r>
+                    </a:p>
+                  </a:txBody>
+                  <a:tcPr anchor="ctr" marB="63500" marT="63500" marR="0" marL="0">
+                    <a:lnL algn="ctr" cmpd="sng" cap="flat" w="12700">
+                      <a:solidFill>
+                        <a:srgbClr val="BEBEBE">
+                          <a:alpha val="100000"/>
+                        </a:srgbClr>
+                      </a:solidFill>
+                      <a:prstDash val="solid"/>
+                    </a:lnL>
+                    <a:lnR algn="ctr" cmpd="sng" cap="flat" w="12700">
+                      <a:solidFill>
+                        <a:srgbClr val="BEBEBE">
+                          <a:alpha val="100000"/>
+                        </a:srgbClr>
+                      </a:solidFill>
+                      <a:prstDash val="solid"/>
+                    </a:lnR>
+                    <a:lnT algn="ctr" cmpd="sng" cap="flat" w="0">
+                      <a:noFill/>
+                      <a:prstDash val="solid"/>
+                    </a:lnT>
+                    <a:lnB algn="ctr" cmpd="sng" cap="flat" w="12700">
+                      <a:solidFill>
+                        <a:srgbClr val="BEBEBE">
+                          <a:alpha val="100000"/>
+                        </a:srgbClr>
+                      </a:solidFill>
+                      <a:prstDash val="solid"/>
+                    </a:lnB>
+                    <a:solidFill>
+                      <a:srgbClr val="FFFFFF">
+                        <a:alpha val="0"/>
+                      </a:srgbClr>
+                    </a:solidFill>
+                  </a:tcPr>
+                </a:tc>
+                <a:tc>
+                  <a:txBody>
+                    <a:bodyPr/>
+                    <a:lstStyle/>
+                    <a:p>
+                      <a:pPr algn="ctr" marL="63500" marR="63500">
+                        <a:lnSpc>
+                          <a:spcPct val="100000"/>
+                        </a:lnSpc>
+                        <a:spcBef>
+                          <a:spcPts val="500"/>
+                        </a:spcBef>
+                        <a:spcAft>
+                          <a:spcPts val="500"/>
+                        </a:spcAft>
+                        <a:buNone/>
+                      </a:pPr>
+                      <a:r>
+                        <a:rPr cap="none" sz="1100" i="0" b="0" u="none">
+                          <a:solidFill>
+                            <a:srgbClr val="000000">
+                              <a:alpha val="100000"/>
+                            </a:srgbClr>
+                          </a:solidFill>
+                          <a:latin typeface="Arial"/>
+                          <a:cs typeface="Arial"/>
+                          <a:ea typeface="Arial"/>
+                          <a:sym typeface="Arial"/>
+                        </a:rPr>
+                        <a:t>0.65</a:t>
+                      </a:r>
+                    </a:p>
+                  </a:txBody>
+                  <a:tcPr anchor="ctr" marB="63500" marT="63500" marR="0" marL="0">
+                    <a:lnL algn="ctr" cmpd="sng" cap="flat" w="12700">
+                      <a:solidFill>
+                        <a:srgbClr val="BEBEBE">
+                          <a:alpha val="100000"/>
+                        </a:srgbClr>
+                      </a:solidFill>
+                      <a:prstDash val="solid"/>
+                    </a:lnL>
+                    <a:lnR algn="ctr" cmpd="sng" cap="flat" w="12700">
+                      <a:solidFill>
+                        <a:srgbClr val="BEBEBE">
+                          <a:alpha val="100000"/>
+                        </a:srgbClr>
+                      </a:solidFill>
+                      <a:prstDash val="solid"/>
+                    </a:lnR>
+                    <a:lnT algn="ctr" cmpd="sng" cap="flat" w="0">
+                      <a:noFill/>
+                      <a:prstDash val="solid"/>
+                    </a:lnT>
+                    <a:lnB algn="ctr" cmpd="sng" cap="flat" w="12700">
+                      <a:solidFill>
+                        <a:srgbClr val="BEBEBE">
+                          <a:alpha val="100000"/>
+                        </a:srgbClr>
+                      </a:solidFill>
+                      <a:prstDash val="solid"/>
+                    </a:lnB>
+                    <a:solidFill>
+                      <a:srgbClr val="FFFFFF">
+                        <a:alpha val="0"/>
+                      </a:srgbClr>
+                    </a:solidFill>
+                  </a:tcPr>
+                </a:tc>
+              </a:tr>
+              <a:tr h="228600">
+                <a:tc>
+                  <a:txBody>
+                    <a:bodyPr/>
+                    <a:lstStyle/>
+                    <a:p>
+                      <a:pPr algn="l" marL="63500" marR="63500">
+                        <a:lnSpc>
+                          <a:spcPct val="100000"/>
+                        </a:lnSpc>
+                        <a:spcBef>
+                          <a:spcPts val="500"/>
+                        </a:spcBef>
+                        <a:spcAft>
+                          <a:spcPts val="500"/>
+                        </a:spcAft>
+                        <a:buNone/>
+                      </a:pPr>
+                      <a:rPr cap="none" sz="1100" i="0" b="0" u="none">
+                        <a:solidFill>
+                          <a:srgbClr val="000000">
+                            <a:alpha val="100000"/>
+                          </a:srgbClr>
+                        </a:solidFill>
+                        <a:latin typeface="Arial"/>
+                        <a:cs typeface="Arial"/>
+                        <a:ea typeface="Arial"/>
+                        <a:sym typeface="Arial"/>
+                      </a:rPr>
+                      <mc:AlternateContent xmlns:mc="http://schemas.openxmlformats.org/markup-compatibility/2006">
+                        <mc:Choice xmlns:a14="http://schemas.microsoft.com/office/drawing/2010/main" Requires="a14">
+                          <a14:m xmlns:a14="http://schemas.microsoft.com/office/drawing/2010/main">
+                            <m:oMathPara xmlns:m="http://schemas.openxmlformats.org/officeDocument/2006/math">
+                              <m:oMathParaPr>
+                                <m:jc m:val="centerGroup"/>
+                              </m:oMathParaPr>
+                              <m:oMath xmlns:m="http://schemas.openxmlformats.org/officeDocument/2006/math" xmlns:mml="http://www.w3.org/1998/Math/MathML">
+                                <m:sSub>
+                                  <m:e>
+                                    <m:r>
+                                      <m:t>β</m:t>
+                                    </m:r>
+                                  </m:e>
+                                  <m:sub>
+                                    <m:r>
+                                      <m:t>1</m:t>
+                                    </m:r>
+                                  </m:sub>
+                                </m:sSub>
+                              </m:oMath>
+                            </m:oMathPara>
+                          </a14:m>
+                        </mc:Choice>
+                      </mc:AlternateContent>
+                    </a:p>
+                  </a:txBody>
+                  <a:tcPr anchor="ctr" marB="63500" marT="63500" marR="0" marL="0">
+                    <a:lnL algn="ctr" cmpd="sng" cap="flat" w="0">
+                      <a:noFill/>
+                      <a:prstDash val="solid"/>
+                    </a:lnL>
+                    <a:lnR algn="ctr" cmpd="sng" cap="flat" w="12700">
+                      <a:solidFill>
+                        <a:srgbClr val="BEBEBE">
+                          <a:alpha val="100000"/>
+                        </a:srgbClr>
+                      </a:solidFill>
+                      <a:prstDash val="solid"/>
+                    </a:lnR>
+                    <a:lnT algn="ctr" cmpd="sng" cap="flat" w="12700">
+                      <a:solidFill>
+                        <a:srgbClr val="BEBEBE">
+                          <a:alpha val="100000"/>
+                        </a:srgbClr>
+                      </a:solidFill>
+                      <a:prstDash val="solid"/>
+                    </a:lnT>
+                    <a:lnB algn="ctr" cmpd="sng" cap="flat" w="25400">
+                      <a:solidFill>
+                        <a:srgbClr val="000000">
+                          <a:alpha val="100000"/>
+                        </a:srgbClr>
+                      </a:solidFill>
+                      <a:prstDash val="solid"/>
+                    </a:lnB>
+                    <a:solidFill>
+                      <a:srgbClr val="FFFFFF">
+                        <a:alpha val="0"/>
+                      </a:srgbClr>
+                    </a:solidFill>
+                  </a:tcPr>
+                </a:tc>
+                <a:tc>
+                  <a:txBody>
+                    <a:bodyPr/>
+                    <a:lstStyle/>
+                    <a:p>
+                      <a:pPr algn="ctr" marL="63500" marR="63500">
+                        <a:lnSpc>
+                          <a:spcPct val="100000"/>
+                        </a:lnSpc>
+                        <a:spcBef>
+                          <a:spcPts val="500"/>
+                        </a:spcBef>
+                        <a:spcAft>
+                          <a:spcPts val="500"/>
+                        </a:spcAft>
+                        <a:buNone/>
+                      </a:pPr>
+                      <a:r>
+                        <a:rPr cap="none" sz="1100" i="0" b="0" u="none">
+                          <a:solidFill>
+                            <a:srgbClr val="000000">
+                              <a:alpha val="100000"/>
+                            </a:srgbClr>
+                          </a:solidFill>
+                          <a:latin typeface="Arial"/>
+                          <a:cs typeface="Arial"/>
+                          <a:ea typeface="Arial"/>
+                          <a:sym typeface="Arial"/>
+                        </a:rPr>
+                        <a:t>0.01</a:t>
+                      </a:r>
+                    </a:p>
+                  </a:txBody>
+                  <a:tcPr anchor="ctr" marB="63500" marT="63500" marR="0" marL="0">
+                    <a:lnL algn="ctr" cmpd="sng" cap="flat" w="12700">
+                      <a:solidFill>
+                        <a:srgbClr val="BEBEBE">
+                          <a:alpha val="100000"/>
+                        </a:srgbClr>
+                      </a:solidFill>
+                      <a:prstDash val="solid"/>
+                    </a:lnL>
+                    <a:lnR algn="ctr" cmpd="sng" cap="flat" w="12700">
+                      <a:solidFill>
+                        <a:srgbClr val="BEBEBE">
+                          <a:alpha val="100000"/>
+                        </a:srgbClr>
+                      </a:solidFill>
+                      <a:prstDash val="solid"/>
+                    </a:lnR>
+                    <a:lnT algn="ctr" cmpd="sng" cap="flat" w="12700">
+                      <a:solidFill>
+                        <a:srgbClr val="BEBEBE">
+                          <a:alpha val="100000"/>
+                        </a:srgbClr>
+                      </a:solidFill>
+                      <a:prstDash val="solid"/>
+                    </a:lnT>
+                    <a:lnB algn="ctr" cmpd="sng" cap="flat" w="25400">
+                      <a:solidFill>
+                        <a:srgbClr val="000000">
+                          <a:alpha val="100000"/>
+                        </a:srgbClr>
+                      </a:solidFill>
+                      <a:prstDash val="solid"/>
+                    </a:lnB>
+                    <a:solidFill>
+                      <a:srgbClr val="FFFFFF">
+                        <a:alpha val="0"/>
+                      </a:srgbClr>
+                    </a:solidFill>
+                  </a:tcPr>
+                </a:tc>
+                <a:tc>
+                  <a:txBody>
+                    <a:bodyPr/>
+                    <a:lstStyle/>
+                    <a:p>
+                      <a:pPr algn="ctr" marL="63500" marR="63500">
+                        <a:lnSpc>
+                          <a:spcPct val="100000"/>
+                        </a:lnSpc>
+                        <a:spcBef>
+                          <a:spcPts val="500"/>
+                        </a:spcBef>
+                        <a:spcAft>
+                          <a:spcPts val="500"/>
+                        </a:spcAft>
+                        <a:buNone/>
+                      </a:pPr>
+                      <a:r>
+                        <a:rPr cap="none" sz="1100" i="0" b="0" u="none">
+                          <a:solidFill>
+                            <a:srgbClr val="000000">
+                              <a:alpha val="100000"/>
+                            </a:srgbClr>
+                          </a:solidFill>
+                          <a:latin typeface="Arial"/>
+                          <a:cs typeface="Arial"/>
+                          <a:ea typeface="Arial"/>
+                          <a:sym typeface="Arial"/>
+                        </a:rPr>
+                        <a:t>0.01</a:t>
+                      </a:r>
+                    </a:p>
+                  </a:txBody>
+                  <a:tcPr anchor="ctr" marB="63500" marT="63500" marR="0" marL="0">
+                    <a:lnL algn="ctr" cmpd="sng" cap="flat" w="12700">
+                      <a:solidFill>
+                        <a:srgbClr val="BEBEBE">
+                          <a:alpha val="100000"/>
+                        </a:srgbClr>
+                      </a:solidFill>
+                      <a:prstDash val="solid"/>
+                    </a:lnL>
+                    <a:lnR algn="ctr" cmpd="sng" cap="flat" w="12700">
+                      <a:solidFill>
+                        <a:srgbClr val="BEBEBE">
+                          <a:alpha val="100000"/>
+                        </a:srgbClr>
+                      </a:solidFill>
+                      <a:prstDash val="solid"/>
+                    </a:lnR>
+                    <a:lnT algn="ctr" cmpd="sng" cap="flat" w="12700">
+                      <a:solidFill>
+                        <a:srgbClr val="BEBEBE">
+                          <a:alpha val="100000"/>
+                        </a:srgbClr>
+                      </a:solidFill>
+                      <a:prstDash val="solid"/>
+                    </a:lnT>
+                    <a:lnB algn="ctr" cmpd="sng" cap="flat" w="25400">
+                      <a:solidFill>
+                        <a:srgbClr val="000000">
+                          <a:alpha val="100000"/>
+                        </a:srgbClr>
+                      </a:solidFill>
+                      <a:prstDash val="solid"/>
+                    </a:lnB>
+                    <a:solidFill>
+                      <a:srgbClr val="FFFFFF">
+                        <a:alpha val="0"/>
+                      </a:srgbClr>
+                    </a:solidFill>
+                  </a:tcPr>
+                </a:tc>
+                <a:tc>
+                  <a:txBody>
+                    <a:bodyPr/>
+                    <a:lstStyle/>
+                    <a:p>
+                      <a:pPr algn="ctr" marL="63500" marR="63500">
+                        <a:lnSpc>
+                          <a:spcPct val="100000"/>
+                        </a:lnSpc>
+                        <a:spcBef>
+                          <a:spcPts val="500"/>
+                        </a:spcBef>
+                        <a:spcAft>
+                          <a:spcPts val="500"/>
+                        </a:spcAft>
+                        <a:buNone/>
+                      </a:pPr>
+                      <a:r>
+                        <a:rPr cap="none" sz="1100" i="0" b="0" u="none">
+                          <a:solidFill>
+                            <a:srgbClr val="000000">
+                              <a:alpha val="100000"/>
+                            </a:srgbClr>
+                          </a:solidFill>
+                          <a:latin typeface="Arial"/>
+                          <a:cs typeface="Arial"/>
+                          <a:ea typeface="Arial"/>
+                          <a:sym typeface="Arial"/>
+                        </a:rPr>
+                        <a:t>2.11</a:t>
+                      </a:r>
+                    </a:p>
+                  </a:txBody>
+                  <a:tcPr anchor="ctr" marB="63500" marT="63500" marR="0" marL="0">
+                    <a:lnL algn="ctr" cmpd="sng" cap="flat" w="12700">
+                      <a:solidFill>
+                        <a:srgbClr val="BEBEBE">
+                          <a:alpha val="100000"/>
+                        </a:srgbClr>
+                      </a:solidFill>
+                      <a:prstDash val="solid"/>
+                    </a:lnL>
+                    <a:lnR algn="ctr" cmpd="sng" cap="flat" w="12700">
+                      <a:solidFill>
+                        <a:srgbClr val="BEBEBE">
+                          <a:alpha val="100000"/>
+                        </a:srgbClr>
+                      </a:solidFill>
+                      <a:prstDash val="solid"/>
+                    </a:lnR>
+                    <a:lnT algn="ctr" cmpd="sng" cap="flat" w="12700">
+                      <a:solidFill>
+                        <a:srgbClr val="BEBEBE">
+                          <a:alpha val="100000"/>
+                        </a:srgbClr>
+                      </a:solidFill>
+                      <a:prstDash val="solid"/>
+                    </a:lnT>
+                    <a:lnB algn="ctr" cmpd="sng" cap="flat" w="25400">
+                      <a:solidFill>
+                        <a:srgbClr val="000000">
+                          <a:alpha val="100000"/>
+                        </a:srgbClr>
+                      </a:solidFill>
+                      <a:prstDash val="solid"/>
+                    </a:lnB>
+                    <a:solidFill>
+                      <a:srgbClr val="FFFFFF">
+                        <a:alpha val="0"/>
+                      </a:srgbClr>
+                    </a:solidFill>
+                  </a:tcPr>
+                </a:tc>
+                <a:tc>
+                  <a:txBody>
+                    <a:bodyPr/>
+                    <a:lstStyle/>
+                    <a:p>
+                      <a:pPr algn="ctr" marL="63500" marR="63500">
+                        <a:lnSpc>
+                          <a:spcPct val="100000"/>
+                        </a:lnSpc>
+                        <a:spcBef>
+                          <a:spcPts val="500"/>
+                        </a:spcBef>
+                        <a:spcAft>
+                          <a:spcPts val="500"/>
+                        </a:spcAft>
+                        <a:buNone/>
+                      </a:pPr>
+                      <a:r>
+                        <a:rPr cap="none" sz="1100" i="0" b="0" u="none">
+                          <a:solidFill>
+                            <a:srgbClr val="000000">
+                              <a:alpha val="100000"/>
+                            </a:srgbClr>
+                          </a:solidFill>
+                          <a:latin typeface="Arial"/>
+                          <a:cs typeface="Arial"/>
+                          <a:ea typeface="Arial"/>
+                          <a:sym typeface="Arial"/>
+                        </a:rPr>
+                        <a:t>0.03</a:t>
+                      </a:r>
+                    </a:p>
+                  </a:txBody>
+                  <a:tcPr anchor="ctr" marB="63500" marT="63500" marR="0" marL="0">
+                    <a:lnL algn="ctr" cmpd="sng" cap="flat" w="12700">
+                      <a:solidFill>
+                        <a:srgbClr val="BEBEBE">
+                          <a:alpha val="100000"/>
+                        </a:srgbClr>
+                      </a:solidFill>
+                      <a:prstDash val="solid"/>
+                    </a:lnL>
+                    <a:lnR algn="ctr" cmpd="sng" cap="flat" w="12700">
+                      <a:solidFill>
+                        <a:srgbClr val="BEBEBE">
+                          <a:alpha val="100000"/>
+                        </a:srgbClr>
+                      </a:solidFill>
+                      <a:prstDash val="solid"/>
+                    </a:lnR>
+                    <a:lnT algn="ctr" cmpd="sng" cap="flat" w="12700">
+                      <a:solidFill>
+                        <a:srgbClr val="BEBEBE">
+                          <a:alpha val="100000"/>
+                        </a:srgbClr>
+                      </a:solidFill>
+                      <a:prstDash val="solid"/>
+                    </a:lnT>
+                    <a:lnB algn="ctr" cmpd="sng" cap="flat" w="25400">
+                      <a:solidFill>
+                        <a:srgbClr val="000000">
+                          <a:alpha val="100000"/>
+                        </a:srgbClr>
+                      </a:solidFill>
+                      <a:prstDash val="solid"/>
+                    </a:lnB>
+                    <a:solidFill>
+                      <a:srgbClr val="FFFFFF">
+                        <a:alpha val="0"/>
+                      </a:srgbClr>
+                    </a:solidFill>
+                  </a:tcPr>
+                </a:tc>
+              </a:tr>
+            </a:tbl>
+          </a:graphicData>
+        </a:graphic>
+      </p:graphicFrame>
     </p:spTree>
   </p:cSld>
 </p:sld>
@@ -5186,31 +6555,6 @@
       </p:grpSpPr>
       <p:sp>
         <p:nvSpPr>
-          <p:cNvPr id="2" name="Title 1"/>
-          <p:cNvSpPr>
-            <a:spLocks noGrp="1"/>
-          </p:cNvSpPr>
-          <p:nvPr>
-            <p:ph type="title"/>
-          </p:nvPr>
-        </p:nvSpPr>
-        <p:spPr/>
-        <p:txBody>
-          <a:bodyPr/>
-          <a:lstStyle/>
-          <a:p>
-            <a:pPr lvl="0" indent="0" marL="0">
-              <a:buNone/>
-            </a:pPr>
-            <a:r>
-              <a:rPr/>
-              <a:t>To be checked</a:t>
-            </a:r>
-          </a:p>
-        </p:txBody>
-      </p:sp>
-      <p:sp>
-        <p:nvSpPr>
           <p:cNvPr id="3" name="Content Placeholder 2"/>
           <p:cNvSpPr>
             <a:spLocks noGrp="1"/>
@@ -5227,21 +6571,28 @@
             <a:pPr lvl="0"/>
             <a:r>
               <a:rPr/>
-              <a:t>Operator vs Positive call rates</a:t>
+              <a:t>Lowest input level (cps/ml) with 95% positive call rates:</a:t>
+            </a:r>
+          </a:p>
+          <a:p>
+            <a:pPr lvl="1"/>
+            <a:r>
+              <a:rPr/>
+              <a:t>282</a:t>
             </a:r>
           </a:p>
           <a:p>
             <a:pPr lvl="0"/>
             <a:r>
               <a:rPr/>
-              <a:t>Day vs Positive call rates</a:t>
-            </a:r>
-          </a:p>
-          <a:p>
-            <a:pPr lvl="0"/>
+              <a:t>Corresponding 95% Wilson CI for the input level (cps/ml):</a:t>
+            </a:r>
+          </a:p>
+          <a:p>
+            <a:pPr lvl="1"/>
             <a:r>
               <a:rPr/>
-              <a:t>Day-Operator vs Positive call rates</a:t>
+              <a:t>c(146, 418)</a:t>
             </a:r>
           </a:p>
         </p:txBody>
@@ -5288,7 +6639,7 @@
             </a:pPr>
             <a:r>
               <a:rPr/>
-              <a:t>Modeling</a:t>
+              <a:t>To be checked</a:t>
             </a:r>
           </a:p>
         </p:txBody>
@@ -5311,6 +6662,90 @@
             <a:pPr lvl="0"/>
             <a:r>
               <a:rPr/>
+              <a:t>Operator vs Positive call rates</a:t>
+            </a:r>
+          </a:p>
+          <a:p>
+            <a:pPr lvl="0"/>
+            <a:r>
+              <a:rPr/>
+              <a:t>Day vs Positive call rates</a:t>
+            </a:r>
+          </a:p>
+          <a:p>
+            <a:pPr lvl="0"/>
+            <a:r>
+              <a:rPr/>
+              <a:t>Day-Operator vs Positive call rates</a:t>
+            </a:r>
+          </a:p>
+        </p:txBody>
+      </p:sp>
+    </p:spTree>
+  </p:cSld>
+</p:sld>
+</file>
+
+<file path=ppt/slides/slide8.xml><?xml version="1.0" encoding="utf-8"?>
+<p:sld xmlns:a="http://schemas.openxmlformats.org/drawingml/2006/main" xmlns:r="http://schemas.openxmlformats.org/officeDocument/2006/relationships" xmlns:p="http://schemas.openxmlformats.org/presentationml/2006/main">
+  <p:cSld>
+    <p:spTree>
+      <p:nvGrpSpPr>
+        <p:cNvPr id="1" name=""/>
+        <p:cNvGrpSpPr/>
+        <p:nvPr/>
+      </p:nvGrpSpPr>
+      <p:grpSpPr>
+        <a:xfrm>
+          <a:off x="0" y="0"/>
+          <a:ext cx="0" cy="0"/>
+          <a:chOff x="0" y="0"/>
+          <a:chExt cx="0" cy="0"/>
+        </a:xfrm>
+      </p:grpSpPr>
+      <p:sp>
+        <p:nvSpPr>
+          <p:cNvPr id="2" name="Title 1"/>
+          <p:cNvSpPr>
+            <a:spLocks noGrp="1"/>
+          </p:cNvSpPr>
+          <p:nvPr>
+            <p:ph type="title"/>
+          </p:nvPr>
+        </p:nvSpPr>
+        <p:spPr/>
+        <p:txBody>
+          <a:bodyPr/>
+          <a:lstStyle/>
+          <a:p>
+            <a:pPr lvl="0" indent="0" marL="0">
+              <a:buNone/>
+            </a:pPr>
+            <a:r>
+              <a:rPr/>
+              <a:t>Modeling</a:t>
+            </a:r>
+          </a:p>
+        </p:txBody>
+      </p:sp>
+      <p:sp>
+        <p:nvSpPr>
+          <p:cNvPr id="3" name="Content Placeholder 2"/>
+          <p:cNvSpPr>
+            <a:spLocks noGrp="1"/>
+          </p:cNvSpPr>
+          <p:nvPr>
+            <p:ph idx="1"/>
+          </p:nvPr>
+        </p:nvSpPr>
+        <p:spPr/>
+        <p:txBody>
+          <a:bodyPr/>
+          <a:lstStyle/>
+          <a:p>
+            <a:pPr lvl="0"/>
+            <a:r>
+              <a:rPr/>
               <a:t>Include the other variables?</a:t>
             </a:r>
           </a:p>
@@ -5323,6 +6758,83 @@
           </a:p>
         </p:txBody>
       </p:sp>
+    </p:spTree>
+  </p:cSld>
+</p:sld>
+</file>
+
+<file path=ppt/slides/slide9.xml><?xml version="1.0" encoding="utf-8"?>
+<p:sld xmlns:a="http://schemas.openxmlformats.org/drawingml/2006/main" xmlns:r="http://schemas.openxmlformats.org/officeDocument/2006/relationships" xmlns:p="http://schemas.openxmlformats.org/presentationml/2006/main">
+  <p:cSld>
+    <p:spTree>
+      <p:nvGrpSpPr>
+        <p:cNvPr id="1" name=""/>
+        <p:cNvGrpSpPr/>
+        <p:nvPr/>
+      </p:nvGrpSpPr>
+      <p:grpSpPr>
+        <a:xfrm>
+          <a:off x="0" y="0"/>
+          <a:ext cx="0" cy="0"/>
+          <a:chOff x="0" y="0"/>
+          <a:chExt cx="0" cy="0"/>
+        </a:xfrm>
+      </p:grpSpPr>
+      <p:sp>
+        <p:nvSpPr>
+          <p:cNvPr id="2" name="Title 1"/>
+          <p:cNvSpPr>
+            <a:spLocks noGrp="1"/>
+          </p:cNvSpPr>
+          <p:nvPr>
+            <p:ph type="title"/>
+          </p:nvPr>
+        </p:nvSpPr>
+        <p:spPr/>
+        <p:txBody>
+          <a:bodyPr/>
+          <a:lstStyle/>
+          <a:p>
+            <a:pPr lvl="0" indent="0" marL="0">
+              <a:buNone/>
+            </a:pPr>
+            <a:r>
+              <a:rPr/>
+              <a:t>Possible consideration: Probit model</a:t>
+            </a:r>
+          </a:p>
+        </p:txBody>
+      </p:sp>
+      <p:pic>
+        <p:nvPicPr>
+          <p:cNvPr descr="graphs/InputLevelvsdetectionPlotProbLogit.png" id="0" name="Picture 1"/>
+          <p:cNvPicPr>
+            <a:picLocks noGrp="1" noChangeAspect="1"/>
+          </p:cNvPicPr>
+          <p:nvPr/>
+        </p:nvPicPr>
+        <p:blipFill>
+          <a:blip r:embed="rId2"/>
+          <a:stretch>
+            <a:fillRect/>
+          </a:stretch>
+        </p:blipFill>
+        <p:spPr bwMode="auto">
+          <a:xfrm>
+            <a:off x="2362200" y="1193800"/>
+            <a:ext cx="4406900" cy="3390900"/>
+          </a:xfrm>
+          <a:prstGeom prst="rect">
+            <a:avLst/>
+          </a:prstGeom>
+          <a:noFill/>
+          <a:ln w="9525">
+            <a:noFill/>
+            <a:headEnd/>
+            <a:tailEnd/>
+          </a:ln>
+        </p:spPr>
+      </p:pic>
     </p:spTree>
   </p:cSld>
 </p:sld>

</xml_diff>